<commit_message>
alignment of option 8
</commit_message>
<xml_diff>
--- a/figures/mhw_figures.pptx
+++ b/figures/mhw_figures.pptx
@@ -18029,7 +18029,7 @@
         </p:nvGrpSpPr>
         <p:grpSpPr>
           <a:xfrm>
-            <a:off x="26975" y="-1105418"/>
+            <a:off x="-12781" y="-1145174"/>
             <a:ext cx="2427711" cy="1131265"/>
             <a:chOff x="806683" y="5125392"/>
             <a:chExt cx="3049511" cy="1542108"/>
@@ -18062,9 +18062,9 @@
                 <a:lumMod val="75000"/>
               </a:schemeClr>
             </a:solidFill>
-            <a:ln>
+            <a:ln w="19050">
               <a:solidFill>
-                <a:schemeClr val="bg1"/>
+                <a:schemeClr val="tx1"/>
               </a:solidFill>
             </a:ln>
           </p:spPr>

</xml_diff>